<commit_message>
Added AWS Public Summit Slides
</commit_message>
<xml_diff>
--- a/slides/AWS-Public-Summit-EKS-Pipeline-QuickStart.pptx
+++ b/slides/AWS-Public-Summit-EKS-Pipeline-QuickStart.pptx
@@ -210,7 +210,7 @@
             <a:fld id="{814910AB-AEF0-414C-82CB-791080B1186B}" type="datetimeFigureOut">
               <a:rPr lang="en-US" smtClean="0"/>
               <a:pPr/>
-              <a:t>6/3/2019</a:t>
+              <a:t>6/4/2019</a:t>
             </a:fld>
             <a:endParaRPr lang="en-US" dirty="0"/>
           </a:p>
@@ -377,7 +377,7 @@
             <a:fld id="{5B4AE38D-E020-46F3-803D-8636C5B7B74E}" type="datetimeFigureOut">
               <a:rPr lang="en-US" smtClean="0"/>
               <a:pPr/>
-              <a:t>6/3/2019</a:t>
+              <a:t>6/4/2019</a:t>
             </a:fld>
             <a:endParaRPr lang="en-US" dirty="0"/>
           </a:p>
@@ -766,7 +766,7 @@
           <a:p>
             <a:fld id="{7785AE33-8762-CB48-8069-61FC714534F0}" type="datetime8">
               <a:rPr lang="en-US" smtClean="0"/>
-              <a:t>6/3/2019 9:49 AM</a:t>
+              <a:t>6/4/2019 9:53 AM</a:t>
             </a:fld>
             <a:endParaRPr lang="en-US" dirty="0"/>
           </a:p>
@@ -931,7 +931,7 @@
           <a:p>
             <a:fld id="{01882E56-9BBC-5549-962E-8E06798B1869}" type="datetime8">
               <a:rPr lang="en-US" smtClean="0"/>
-              <a:t>6/3/2019 9:50 AM</a:t>
+              <a:t>6/4/2019 9:53 AM</a:t>
             </a:fld>
             <a:endParaRPr lang="en-US" dirty="0"/>
           </a:p>
@@ -1177,7 +1177,7 @@
           <a:p>
             <a:fld id="{5BE8237A-4D68-A141-8155-E7C5F376347F}" type="datetime8">
               <a:rPr lang="en-US" smtClean="0"/>
-              <a:t>6/3/2019 10:30 AM</a:t>
+              <a:t>6/4/2019 9:53 AM</a:t>
             </a:fld>
             <a:endParaRPr lang="en-US" dirty="0"/>
           </a:p>
@@ -1572,7 +1572,7 @@
             <a:fld id="{7DDB771E-4AED-4DD3-8AA1-5D9FD2224F14}" type="datetimeFigureOut">
               <a:rPr lang="en-US" smtClean="0"/>
               <a:pPr/>
-              <a:t>6/3/2019</a:t>
+              <a:t>6/4/2019</a:t>
             </a:fld>
             <a:endParaRPr lang="en-US" dirty="0"/>
           </a:p>
@@ -1739,7 +1739,7 @@
             <a:fld id="{7DDB771E-4AED-4DD3-8AA1-5D9FD2224F14}" type="datetimeFigureOut">
               <a:rPr lang="en-US" smtClean="0"/>
               <a:pPr/>
-              <a:t>6/3/2019</a:t>
+              <a:t>6/4/2019</a:t>
             </a:fld>
             <a:endParaRPr lang="en-US" dirty="0"/>
           </a:p>
@@ -1916,7 +1916,7 @@
             <a:fld id="{7DDB771E-4AED-4DD3-8AA1-5D9FD2224F14}" type="datetimeFigureOut">
               <a:rPr lang="en-US" smtClean="0"/>
               <a:pPr/>
-              <a:t>6/3/2019</a:t>
+              <a:t>6/4/2019</a:t>
             </a:fld>
             <a:endParaRPr lang="en-US" dirty="0"/>
           </a:p>
@@ -2000,7 +2000,7 @@
           <p:cNvPr id="9" name="pubsecblue">
             <a:extLst>
               <a:ext uri="{FF2B5EF4-FFF2-40B4-BE49-F238E27FC236}">
-                <a16:creationId xmlns="" xmlns:a16="http://schemas.microsoft.com/office/drawing/2014/main" id="{1A186D19-95DE-4770-AAE6-494ED68B3DBE}"/>
+                <a16:creationId xmlns:a16="http://schemas.microsoft.com/office/drawing/2014/main" xmlns="" id="{1A186D19-95DE-4770-AAE6-494ED68B3DBE}"/>
               </a:ext>
             </a:extLst>
           </p:cNvPr>
@@ -2036,7 +2036,7 @@
           <p:cNvPr id="7" name="Text Placeholder 2">
             <a:extLst>
               <a:ext uri="{FF2B5EF4-FFF2-40B4-BE49-F238E27FC236}">
-                <a16:creationId xmlns="" xmlns:a16="http://schemas.microsoft.com/office/drawing/2014/main" id="{267E3236-3BFA-49FE-817B-CDA727884803}"/>
+                <a16:creationId xmlns:a16="http://schemas.microsoft.com/office/drawing/2014/main" xmlns="" id="{267E3236-3BFA-49FE-817B-CDA727884803}"/>
               </a:ext>
             </a:extLst>
           </p:cNvPr>
@@ -2124,7 +2124,7 @@
           <p:cNvPr id="12" name="TextBox 11">
             <a:extLst>
               <a:ext uri="{FF2B5EF4-FFF2-40B4-BE49-F238E27FC236}">
-                <a16:creationId xmlns="" xmlns:a16="http://schemas.microsoft.com/office/drawing/2014/main" id="{630B8BD6-A711-4A2B-B746-1B6F5FF44CFA}"/>
+                <a16:creationId xmlns:a16="http://schemas.microsoft.com/office/drawing/2014/main" xmlns="" id="{630B8BD6-A711-4A2B-B746-1B6F5FF44CFA}"/>
               </a:ext>
             </a:extLst>
           </p:cNvPr>
@@ -2186,7 +2186,7 @@
           <p:cNvPr id="8" name="TextBox 3">
             <a:extLst>
               <a:ext uri="{FF2B5EF4-FFF2-40B4-BE49-F238E27FC236}">
-                <a16:creationId xmlns="" xmlns:a16="http://schemas.microsoft.com/office/drawing/2014/main" id="{A0C29897-1EC9-4802-9757-D6B748FD2811}"/>
+                <a16:creationId xmlns:a16="http://schemas.microsoft.com/office/drawing/2014/main" xmlns="" id="{A0C29897-1EC9-4802-9757-D6B748FD2811}"/>
               </a:ext>
             </a:extLst>
           </p:cNvPr>
@@ -2350,7 +2350,7 @@
           <p:cNvPr id="11" name="Group 10">
             <a:extLst>
               <a:ext uri="{FF2B5EF4-FFF2-40B4-BE49-F238E27FC236}">
-                <a16:creationId xmlns="" xmlns:a16="http://schemas.microsoft.com/office/drawing/2014/main" id="{6429CA96-3899-4829-8322-D56425154EF6}"/>
+                <a16:creationId xmlns:a16="http://schemas.microsoft.com/office/drawing/2014/main" xmlns="" id="{6429CA96-3899-4829-8322-D56425154EF6}"/>
               </a:ext>
             </a:extLst>
           </p:cNvPr>
@@ -2370,7 +2370,7 @@
             <p:cNvPr id="13" name="TextBox 12">
               <a:extLst>
                 <a:ext uri="{FF2B5EF4-FFF2-40B4-BE49-F238E27FC236}">
-                  <a16:creationId xmlns="" xmlns:a16="http://schemas.microsoft.com/office/drawing/2014/main" id="{1C68D930-6BA1-415F-AF01-DE13B3496E0F}"/>
+                  <a16:creationId xmlns:a16="http://schemas.microsoft.com/office/drawing/2014/main" xmlns="" id="{1C68D930-6BA1-415F-AF01-DE13B3496E0F}"/>
                 </a:ext>
               </a:extLst>
             </p:cNvPr>
@@ -2420,7 +2420,7 @@
             <p:cNvPr id="14" name="Freeform: Shape 13">
               <a:extLst>
                 <a:ext uri="{FF2B5EF4-FFF2-40B4-BE49-F238E27FC236}">
-                  <a16:creationId xmlns="" xmlns:a16="http://schemas.microsoft.com/office/drawing/2014/main" id="{1D019969-CBDF-4237-B852-A32D22443744}"/>
+                  <a16:creationId xmlns:a16="http://schemas.microsoft.com/office/drawing/2014/main" xmlns="" id="{1D019969-CBDF-4237-B852-A32D22443744}"/>
                 </a:ext>
               </a:extLst>
             </p:cNvPr>
@@ -3856,7 +3856,7 @@
           <p:cNvPr id="22" name="pubsecblue">
             <a:extLst>
               <a:ext uri="{FF2B5EF4-FFF2-40B4-BE49-F238E27FC236}">
-                <a16:creationId xmlns="" xmlns:a16="http://schemas.microsoft.com/office/drawing/2014/main" id="{664491D0-D7B1-419D-B5D9-1449FC9D1505}"/>
+                <a16:creationId xmlns:a16="http://schemas.microsoft.com/office/drawing/2014/main" xmlns="" id="{664491D0-D7B1-419D-B5D9-1449FC9D1505}"/>
               </a:ext>
             </a:extLst>
           </p:cNvPr>
@@ -3892,7 +3892,7 @@
           <p:cNvPr id="46" name="Freeform: Shape 45">
             <a:extLst>
               <a:ext uri="{FF2B5EF4-FFF2-40B4-BE49-F238E27FC236}">
-                <a16:creationId xmlns="" xmlns:a16="http://schemas.microsoft.com/office/drawing/2014/main" id="{49DC84CA-CE72-4309-9EAB-66ED7D370A86}"/>
+                <a16:creationId xmlns:a16="http://schemas.microsoft.com/office/drawing/2014/main" xmlns="" id="{49DC84CA-CE72-4309-9EAB-66ED7D370A86}"/>
               </a:ext>
             </a:extLst>
           </p:cNvPr>
@@ -5287,7 +5287,7 @@
           <p:cNvPr id="47" name="TextBox 46">
             <a:extLst>
               <a:ext uri="{FF2B5EF4-FFF2-40B4-BE49-F238E27FC236}">
-                <a16:creationId xmlns="" xmlns:a16="http://schemas.microsoft.com/office/drawing/2014/main" id="{FE7BE31F-D58F-4CDD-BCD0-B28352F4F15B}"/>
+                <a16:creationId xmlns:a16="http://schemas.microsoft.com/office/drawing/2014/main" xmlns="" id="{FE7BE31F-D58F-4CDD-BCD0-B28352F4F15B}"/>
               </a:ext>
             </a:extLst>
           </p:cNvPr>
@@ -5358,7 +5358,7 @@
           <p:cNvPr id="76" name="Text Placeholder 75">
             <a:extLst>
               <a:ext uri="{FF2B5EF4-FFF2-40B4-BE49-F238E27FC236}">
-                <a16:creationId xmlns="" xmlns:a16="http://schemas.microsoft.com/office/drawing/2014/main" id="{7583CAB4-7373-41F5-97EA-0A14FC06C556}"/>
+                <a16:creationId xmlns:a16="http://schemas.microsoft.com/office/drawing/2014/main" xmlns="" id="{7583CAB4-7373-41F5-97EA-0A14FC06C556}"/>
               </a:ext>
             </a:extLst>
           </p:cNvPr>
@@ -5462,7 +5462,7 @@
           <p:cNvPr id="10" name="Picture 9">
             <a:extLst>
               <a:ext uri="{FF2B5EF4-FFF2-40B4-BE49-F238E27FC236}">
-                <a16:creationId xmlns="" xmlns:a16="http://schemas.microsoft.com/office/drawing/2014/main" id="{FA036C39-4AED-47FC-8411-6A2DD597B9D1}"/>
+                <a16:creationId xmlns:a16="http://schemas.microsoft.com/office/drawing/2014/main" xmlns="" id="{FA036C39-4AED-47FC-8411-6A2DD597B9D1}"/>
               </a:ext>
             </a:extLst>
           </p:cNvPr>
@@ -5679,7 +5679,7 @@
           <p:cNvPr id="12" name="TextBox 3">
             <a:extLst>
               <a:ext uri="{FF2B5EF4-FFF2-40B4-BE49-F238E27FC236}">
-                <a16:creationId xmlns="" xmlns:a16="http://schemas.microsoft.com/office/drawing/2014/main" id="{6F758A9E-D98A-4B48-B7C9-FD59B2A7D711}"/>
+                <a16:creationId xmlns:a16="http://schemas.microsoft.com/office/drawing/2014/main" xmlns="" id="{6F758A9E-D98A-4B48-B7C9-FD59B2A7D711}"/>
               </a:ext>
             </a:extLst>
           </p:cNvPr>
@@ -5843,7 +5843,7 @@
           <p:cNvPr id="14" name="Group 13">
             <a:extLst>
               <a:ext uri="{FF2B5EF4-FFF2-40B4-BE49-F238E27FC236}">
-                <a16:creationId xmlns="" xmlns:a16="http://schemas.microsoft.com/office/drawing/2014/main" id="{978734A4-78A3-4B0F-8BA1-D4EEAF971FBD}"/>
+                <a16:creationId xmlns:a16="http://schemas.microsoft.com/office/drawing/2014/main" xmlns="" id="{978734A4-78A3-4B0F-8BA1-D4EEAF971FBD}"/>
               </a:ext>
             </a:extLst>
           </p:cNvPr>
@@ -5863,7 +5863,7 @@
             <p:cNvPr id="22" name="TextBox 21">
               <a:extLst>
                 <a:ext uri="{FF2B5EF4-FFF2-40B4-BE49-F238E27FC236}">
-                  <a16:creationId xmlns="" xmlns:a16="http://schemas.microsoft.com/office/drawing/2014/main" id="{4815F495-94F2-4A6F-AB73-2B0266FF76D2}"/>
+                  <a16:creationId xmlns:a16="http://schemas.microsoft.com/office/drawing/2014/main" xmlns="" id="{4815F495-94F2-4A6F-AB73-2B0266FF76D2}"/>
                 </a:ext>
               </a:extLst>
             </p:cNvPr>
@@ -5913,7 +5913,7 @@
             <p:cNvPr id="21" name="Freeform: Shape 20">
               <a:extLst>
                 <a:ext uri="{FF2B5EF4-FFF2-40B4-BE49-F238E27FC236}">
-                  <a16:creationId xmlns="" xmlns:a16="http://schemas.microsoft.com/office/drawing/2014/main" id="{FCC86498-E577-4693-97D6-E4A4454E0AD4}"/>
+                  <a16:creationId xmlns:a16="http://schemas.microsoft.com/office/drawing/2014/main" xmlns="" id="{FCC86498-E577-4693-97D6-E4A4454E0AD4}"/>
                 </a:ext>
               </a:extLst>
             </p:cNvPr>
@@ -7349,7 +7349,7 @@
           <p:cNvPr id="15" name="pubsecblue">
             <a:extLst>
               <a:ext uri="{FF2B5EF4-FFF2-40B4-BE49-F238E27FC236}">
-                <a16:creationId xmlns="" xmlns:a16="http://schemas.microsoft.com/office/drawing/2014/main" id="{525C47FE-A728-4B64-8A4B-FA1C0E05E67B}"/>
+                <a16:creationId xmlns:a16="http://schemas.microsoft.com/office/drawing/2014/main" xmlns="" id="{525C47FE-A728-4B64-8A4B-FA1C0E05E67B}"/>
               </a:ext>
             </a:extLst>
           </p:cNvPr>
@@ -7431,7 +7431,7 @@
           <p:cNvPr id="7" name="TextBox 3">
             <a:extLst>
               <a:ext uri="{FF2B5EF4-FFF2-40B4-BE49-F238E27FC236}">
-                <a16:creationId xmlns="" xmlns:a16="http://schemas.microsoft.com/office/drawing/2014/main" id="{5E4808A6-4613-40BD-95F0-43BFC8327720}"/>
+                <a16:creationId xmlns:a16="http://schemas.microsoft.com/office/drawing/2014/main" xmlns="" id="{5E4808A6-4613-40BD-95F0-43BFC8327720}"/>
               </a:ext>
             </a:extLst>
           </p:cNvPr>
@@ -7595,7 +7595,7 @@
           <p:cNvPr id="11" name="Group 10">
             <a:extLst>
               <a:ext uri="{FF2B5EF4-FFF2-40B4-BE49-F238E27FC236}">
-                <a16:creationId xmlns="" xmlns:a16="http://schemas.microsoft.com/office/drawing/2014/main" id="{6E2AD9A2-F9BD-44EC-B2C7-643FA8ED744C}"/>
+                <a16:creationId xmlns:a16="http://schemas.microsoft.com/office/drawing/2014/main" xmlns="" id="{6E2AD9A2-F9BD-44EC-B2C7-643FA8ED744C}"/>
               </a:ext>
             </a:extLst>
           </p:cNvPr>
@@ -7615,7 +7615,7 @@
             <p:cNvPr id="12" name="TextBox 11">
               <a:extLst>
                 <a:ext uri="{FF2B5EF4-FFF2-40B4-BE49-F238E27FC236}">
-                  <a16:creationId xmlns="" xmlns:a16="http://schemas.microsoft.com/office/drawing/2014/main" id="{11904D6E-51A6-4FA4-94B6-F01D529B7C24}"/>
+                  <a16:creationId xmlns:a16="http://schemas.microsoft.com/office/drawing/2014/main" xmlns="" id="{11904D6E-51A6-4FA4-94B6-F01D529B7C24}"/>
                 </a:ext>
               </a:extLst>
             </p:cNvPr>
@@ -7665,7 +7665,7 @@
             <p:cNvPr id="13" name="Freeform: Shape 12">
               <a:extLst>
                 <a:ext uri="{FF2B5EF4-FFF2-40B4-BE49-F238E27FC236}">
-                  <a16:creationId xmlns="" xmlns:a16="http://schemas.microsoft.com/office/drawing/2014/main" id="{A856E380-8D41-4717-90CA-50E696F3E65E}"/>
+                  <a16:creationId xmlns:a16="http://schemas.microsoft.com/office/drawing/2014/main" xmlns="" id="{A856E380-8D41-4717-90CA-50E696F3E65E}"/>
                 </a:ext>
               </a:extLst>
             </p:cNvPr>
@@ -9184,7 +9184,7 @@
             <a:fld id="{7DDB771E-4AED-4DD3-8AA1-5D9FD2224F14}" type="datetimeFigureOut">
               <a:rPr lang="en-US" smtClean="0"/>
               <a:pPr/>
-              <a:t>6/3/2019</a:t>
+              <a:t>6/4/2019</a:t>
             </a:fld>
             <a:endParaRPr lang="en-US" dirty="0"/>
           </a:p>
@@ -9427,7 +9427,7 @@
             <a:fld id="{7DDB771E-4AED-4DD3-8AA1-5D9FD2224F14}" type="datetimeFigureOut">
               <a:rPr lang="en-US" smtClean="0"/>
               <a:pPr/>
-              <a:t>6/3/2019</a:t>
+              <a:t>6/4/2019</a:t>
             </a:fld>
             <a:endParaRPr lang="en-US" dirty="0"/>
           </a:p>
@@ -9712,7 +9712,7 @@
             <a:fld id="{7DDB771E-4AED-4DD3-8AA1-5D9FD2224F14}" type="datetimeFigureOut">
               <a:rPr lang="en-US" smtClean="0"/>
               <a:pPr/>
-              <a:t>6/3/2019</a:t>
+              <a:t>6/4/2019</a:t>
             </a:fld>
             <a:endParaRPr lang="en-US" dirty="0"/>
           </a:p>
@@ -10131,7 +10131,7 @@
             <a:fld id="{7DDB771E-4AED-4DD3-8AA1-5D9FD2224F14}" type="datetimeFigureOut">
               <a:rPr lang="en-US" smtClean="0"/>
               <a:pPr/>
-              <a:t>6/3/2019</a:t>
+              <a:t>6/4/2019</a:t>
             </a:fld>
             <a:endParaRPr lang="en-US" dirty="0"/>
           </a:p>
@@ -10246,7 +10246,7 @@
             <a:fld id="{7DDB771E-4AED-4DD3-8AA1-5D9FD2224F14}" type="datetimeFigureOut">
               <a:rPr lang="en-US" smtClean="0"/>
               <a:pPr/>
-              <a:t>6/3/2019</a:t>
+              <a:t>6/4/2019</a:t>
             </a:fld>
             <a:endParaRPr lang="en-US" dirty="0"/>
           </a:p>
@@ -10338,7 +10338,7 @@
             <a:fld id="{7DDB771E-4AED-4DD3-8AA1-5D9FD2224F14}" type="datetimeFigureOut">
               <a:rPr lang="en-US" smtClean="0"/>
               <a:pPr/>
-              <a:t>6/3/2019</a:t>
+              <a:t>6/4/2019</a:t>
             </a:fld>
             <a:endParaRPr lang="en-US" dirty="0"/>
           </a:p>
@@ -10612,7 +10612,7 @@
             <a:fld id="{7DDB771E-4AED-4DD3-8AA1-5D9FD2224F14}" type="datetimeFigureOut">
               <a:rPr lang="en-US" smtClean="0"/>
               <a:pPr/>
-              <a:t>6/3/2019</a:t>
+              <a:t>6/4/2019</a:t>
             </a:fld>
             <a:endParaRPr lang="en-US" dirty="0"/>
           </a:p>
@@ -10862,7 +10862,7 @@
             <a:fld id="{7DDB771E-4AED-4DD3-8AA1-5D9FD2224F14}" type="datetimeFigureOut">
               <a:rPr lang="en-US" smtClean="0"/>
               <a:pPr/>
-              <a:t>6/3/2019</a:t>
+              <a:t>6/4/2019</a:t>
             </a:fld>
             <a:endParaRPr lang="en-US" dirty="0"/>
           </a:p>
@@ -11072,7 +11072,7 @@
             <a:fld id="{7DDB771E-4AED-4DD3-8AA1-5D9FD2224F14}" type="datetimeFigureOut">
               <a:rPr lang="en-US" smtClean="0"/>
               <a:pPr/>
-              <a:t>6/3/2019</a:t>
+              <a:t>6/4/2019</a:t>
             </a:fld>
             <a:endParaRPr lang="en-US" dirty="0"/>
           </a:p>
@@ -11482,7 +11482,7 @@
           <p:cNvPr id="2" name="Text Placeholder 1">
             <a:extLst>
               <a:ext uri="{FF2B5EF4-FFF2-40B4-BE49-F238E27FC236}">
-                <a16:creationId xmlns="" xmlns:a16="http://schemas.microsoft.com/office/drawing/2014/main" id="{95BA791F-4607-4F4A-9AD6-5905307D3FD0}"/>
+                <a16:creationId xmlns:a16="http://schemas.microsoft.com/office/drawing/2014/main" xmlns="" id="{95BA791F-4607-4F4A-9AD6-5905307D3FD0}"/>
               </a:ext>
             </a:extLst>
           </p:cNvPr>
@@ -11647,11 +11647,7 @@
             </a:pPr>
             <a:r>
               <a:rPr lang="en-US" dirty="0" smtClean="0"/>
-              <a:t>  To save time the AWS EKS Cluster, the AWS CodePipeline, and the sample-app have already been </a:t>
-            </a:r>
-            <a:r>
-              <a:rPr lang="en-US" dirty="0" smtClean="0"/>
-              <a:t>deployed to the cluster.</a:t>
+              <a:t>  To save time the AWS EKS Cluster, the AWS CodePipeline, and the sample-app have already been deployed to the cluster.</a:t>
             </a:r>
           </a:p>
           <a:p>
@@ -11661,17 +11657,8 @@
             </a:pPr>
             <a:r>
               <a:rPr lang="en-US" dirty="0" smtClean="0"/>
-              <a:t>   </a:t>
-            </a:r>
-            <a:r>
-              <a:rPr lang="en-US" dirty="0" smtClean="0"/>
-              <a:t>We’ll</a:t>
-            </a:r>
-            <a:r>
-              <a:rPr lang="en-US" dirty="0" smtClean="0"/>
-              <a:t>:</a:t>
-            </a:r>
-            <a:endParaRPr lang="en-US" dirty="0" smtClean="0"/>
+              <a:t>   We’ll:</a:t>
+            </a:r>
           </a:p>
           <a:p>
             <a:pPr lvl="1">
@@ -11719,17 +11706,8 @@
             </a:r>
             <a:r>
               <a:rPr lang="en-US" dirty="0" smtClean="0"/>
-              <a:t> We should see the message “Hello World” appear when we access the load balancer </a:t>
-            </a:r>
-            <a:r>
-              <a:rPr lang="en-US" dirty="0" smtClean="0"/>
-              <a:t>endpoint for the </a:t>
-            </a:r>
-            <a:r>
-              <a:rPr lang="en-US" dirty="0" err="1" smtClean="0"/>
-              <a:t>microservice</a:t>
-            </a:r>
-            <a:endParaRPr lang="en-US" dirty="0" smtClean="0"/>
+              <a:t> We should see the message “Hello World” appear when we access the load balancer endpoint for the microservice</a:t>
+            </a:r>
           </a:p>
         </p:txBody>
       </p:sp>
@@ -11835,15 +11813,7 @@
             </a:r>
             <a:r>
               <a:rPr lang="en-US" dirty="0" smtClean="0"/>
-              <a:t> </a:t>
-            </a:r>
-            <a:r>
-              <a:rPr lang="en-US" dirty="0" smtClean="0"/>
-              <a:t>Pipeline supports </a:t>
-            </a:r>
-            <a:r>
-              <a:rPr lang="en-US" dirty="0" smtClean="0"/>
-              <a:t>only a Simple Delivery Process</a:t>
+              <a:t> Pipeline supports only a Simple Delivery Process</a:t>
             </a:r>
           </a:p>
           <a:p>
@@ -12167,7 +12137,7 @@
           <p:cNvPr id="3" name="Text Placeholder 2">
             <a:extLst>
               <a:ext uri="{FF2B5EF4-FFF2-40B4-BE49-F238E27FC236}">
-                <a16:creationId xmlns="" xmlns:a16="http://schemas.microsoft.com/office/drawing/2014/main" id="{CBD10F38-2636-4CED-A3FB-F0E2990384F9}"/>
+                <a16:creationId xmlns:a16="http://schemas.microsoft.com/office/drawing/2014/main" xmlns="" id="{CBD10F38-2636-4CED-A3FB-F0E2990384F9}"/>
               </a:ext>
             </a:extLst>
           </p:cNvPr>
@@ -12218,7 +12188,6 @@
               <a:rPr lang="en-US" dirty="0"/>
               <a:t>kirk.kalvar@kal.technology</a:t>
             </a:r>
-            <a:endParaRPr lang="en-US" dirty="0"/>
           </a:p>
         </p:txBody>
       </p:sp>
@@ -12976,11 +12945,7 @@
             </a:pPr>
             <a:r>
               <a:rPr lang="en-US" dirty="0" smtClean="0"/>
-              <a:t>  EC2 Instance with “kubectl” installed and configured to talk to the </a:t>
-            </a:r>
-            <a:r>
-              <a:rPr lang="en-US" dirty="0" smtClean="0"/>
-              <a:t>cluster</a:t>
+              <a:t>  EC2 Instance with “kubectl” installed and configured to talk to the cluster</a:t>
             </a:r>
           </a:p>
           <a:p>
@@ -12996,7 +12961,6 @@
               <a:rPr lang="en-US" dirty="0" smtClean="0"/>
               <a:t> Optional Kubernetes Dashboard</a:t>
             </a:r>
-            <a:endParaRPr lang="en-US" dirty="0" smtClean="0"/>
           </a:p>
         </p:txBody>
       </p:sp>
@@ -13324,7 +13288,6 @@
               <a:rPr lang="en-US" dirty="0" smtClean="0"/>
               <a:t>Pipeline</a:t>
             </a:r>
-            <a:endParaRPr lang="en-US" dirty="0" smtClean="0"/>
           </a:p>
         </p:txBody>
       </p:sp>

</xml_diff>

<commit_message>
Updated AWS Public Summit Slides
</commit_message>
<xml_diff>
--- a/slides/AWS-Public-Summit-EKS-Pipeline-QuickStart.pptx
+++ b/slides/AWS-Public-Summit-EKS-Pipeline-QuickStart.pptx
@@ -210,7 +210,7 @@
             <a:fld id="{814910AB-AEF0-414C-82CB-791080B1186B}" type="datetimeFigureOut">
               <a:rPr lang="en-US" smtClean="0"/>
               <a:pPr/>
-              <a:t>6/4/2019</a:t>
+              <a:t>6/5/2019</a:t>
             </a:fld>
             <a:endParaRPr lang="en-US" dirty="0"/>
           </a:p>
@@ -377,7 +377,7 @@
             <a:fld id="{5B4AE38D-E020-46F3-803D-8636C5B7B74E}" type="datetimeFigureOut">
               <a:rPr lang="en-US" smtClean="0"/>
               <a:pPr/>
-              <a:t>6/4/2019</a:t>
+              <a:t>6/5/2019</a:t>
             </a:fld>
             <a:endParaRPr lang="en-US" dirty="0"/>
           </a:p>
@@ -766,7 +766,7 @@
           <a:p>
             <a:fld id="{7785AE33-8762-CB48-8069-61FC714534F0}" type="datetime8">
               <a:rPr lang="en-US" smtClean="0"/>
-              <a:t>6/4/2019 9:53 AM</a:t>
+              <a:t>6/5/2019 1:08 PM</a:t>
             </a:fld>
             <a:endParaRPr lang="en-US" dirty="0"/>
           </a:p>
@@ -931,7 +931,7 @@
           <a:p>
             <a:fld id="{01882E56-9BBC-5549-962E-8E06798B1869}" type="datetime8">
               <a:rPr lang="en-US" smtClean="0"/>
-              <a:t>6/4/2019 9:53 AM</a:t>
+              <a:t>6/5/2019 1:08 PM</a:t>
             </a:fld>
             <a:endParaRPr lang="en-US" dirty="0"/>
           </a:p>
@@ -1177,7 +1177,7 @@
           <a:p>
             <a:fld id="{5BE8237A-4D68-A141-8155-E7C5F376347F}" type="datetime8">
               <a:rPr lang="en-US" smtClean="0"/>
-              <a:t>6/4/2019 9:53 AM</a:t>
+              <a:t>6/5/2019 1:08 PM</a:t>
             </a:fld>
             <a:endParaRPr lang="en-US" dirty="0"/>
           </a:p>
@@ -1572,7 +1572,7 @@
             <a:fld id="{7DDB771E-4AED-4DD3-8AA1-5D9FD2224F14}" type="datetimeFigureOut">
               <a:rPr lang="en-US" smtClean="0"/>
               <a:pPr/>
-              <a:t>6/4/2019</a:t>
+              <a:t>6/5/2019</a:t>
             </a:fld>
             <a:endParaRPr lang="en-US" dirty="0"/>
           </a:p>
@@ -1739,7 +1739,7 @@
             <a:fld id="{7DDB771E-4AED-4DD3-8AA1-5D9FD2224F14}" type="datetimeFigureOut">
               <a:rPr lang="en-US" smtClean="0"/>
               <a:pPr/>
-              <a:t>6/4/2019</a:t>
+              <a:t>6/5/2019</a:t>
             </a:fld>
             <a:endParaRPr lang="en-US" dirty="0"/>
           </a:p>
@@ -1916,7 +1916,7 @@
             <a:fld id="{7DDB771E-4AED-4DD3-8AA1-5D9FD2224F14}" type="datetimeFigureOut">
               <a:rPr lang="en-US" smtClean="0"/>
               <a:pPr/>
-              <a:t>6/4/2019</a:t>
+              <a:t>6/5/2019</a:t>
             </a:fld>
             <a:endParaRPr lang="en-US" dirty="0"/>
           </a:p>
@@ -2000,7 +2000,7 @@
           <p:cNvPr id="9" name="pubsecblue">
             <a:extLst>
               <a:ext uri="{FF2B5EF4-FFF2-40B4-BE49-F238E27FC236}">
-                <a16:creationId xmlns:a16="http://schemas.microsoft.com/office/drawing/2014/main" xmlns="" id="{1A186D19-95DE-4770-AAE6-494ED68B3DBE}"/>
+                <a16:creationId xmlns="" xmlns:a16="http://schemas.microsoft.com/office/drawing/2014/main" id="{1A186D19-95DE-4770-AAE6-494ED68B3DBE}"/>
               </a:ext>
             </a:extLst>
           </p:cNvPr>
@@ -2036,7 +2036,7 @@
           <p:cNvPr id="7" name="Text Placeholder 2">
             <a:extLst>
               <a:ext uri="{FF2B5EF4-FFF2-40B4-BE49-F238E27FC236}">
-                <a16:creationId xmlns:a16="http://schemas.microsoft.com/office/drawing/2014/main" xmlns="" id="{267E3236-3BFA-49FE-817B-CDA727884803}"/>
+                <a16:creationId xmlns="" xmlns:a16="http://schemas.microsoft.com/office/drawing/2014/main" id="{267E3236-3BFA-49FE-817B-CDA727884803}"/>
               </a:ext>
             </a:extLst>
           </p:cNvPr>
@@ -2124,7 +2124,7 @@
           <p:cNvPr id="12" name="TextBox 11">
             <a:extLst>
               <a:ext uri="{FF2B5EF4-FFF2-40B4-BE49-F238E27FC236}">
-                <a16:creationId xmlns:a16="http://schemas.microsoft.com/office/drawing/2014/main" xmlns="" id="{630B8BD6-A711-4A2B-B746-1B6F5FF44CFA}"/>
+                <a16:creationId xmlns="" xmlns:a16="http://schemas.microsoft.com/office/drawing/2014/main" id="{630B8BD6-A711-4A2B-B746-1B6F5FF44CFA}"/>
               </a:ext>
             </a:extLst>
           </p:cNvPr>
@@ -2186,7 +2186,7 @@
           <p:cNvPr id="8" name="TextBox 3">
             <a:extLst>
               <a:ext uri="{FF2B5EF4-FFF2-40B4-BE49-F238E27FC236}">
-                <a16:creationId xmlns:a16="http://schemas.microsoft.com/office/drawing/2014/main" xmlns="" id="{A0C29897-1EC9-4802-9757-D6B748FD2811}"/>
+                <a16:creationId xmlns="" xmlns:a16="http://schemas.microsoft.com/office/drawing/2014/main" id="{A0C29897-1EC9-4802-9757-D6B748FD2811}"/>
               </a:ext>
             </a:extLst>
           </p:cNvPr>
@@ -2350,7 +2350,7 @@
           <p:cNvPr id="11" name="Group 10">
             <a:extLst>
               <a:ext uri="{FF2B5EF4-FFF2-40B4-BE49-F238E27FC236}">
-                <a16:creationId xmlns:a16="http://schemas.microsoft.com/office/drawing/2014/main" xmlns="" id="{6429CA96-3899-4829-8322-D56425154EF6}"/>
+                <a16:creationId xmlns="" xmlns:a16="http://schemas.microsoft.com/office/drawing/2014/main" id="{6429CA96-3899-4829-8322-D56425154EF6}"/>
               </a:ext>
             </a:extLst>
           </p:cNvPr>
@@ -2370,7 +2370,7 @@
             <p:cNvPr id="13" name="TextBox 12">
               <a:extLst>
                 <a:ext uri="{FF2B5EF4-FFF2-40B4-BE49-F238E27FC236}">
-                  <a16:creationId xmlns:a16="http://schemas.microsoft.com/office/drawing/2014/main" xmlns="" id="{1C68D930-6BA1-415F-AF01-DE13B3496E0F}"/>
+                  <a16:creationId xmlns="" xmlns:a16="http://schemas.microsoft.com/office/drawing/2014/main" id="{1C68D930-6BA1-415F-AF01-DE13B3496E0F}"/>
                 </a:ext>
               </a:extLst>
             </p:cNvPr>
@@ -2420,7 +2420,7 @@
             <p:cNvPr id="14" name="Freeform: Shape 13">
               <a:extLst>
                 <a:ext uri="{FF2B5EF4-FFF2-40B4-BE49-F238E27FC236}">
-                  <a16:creationId xmlns:a16="http://schemas.microsoft.com/office/drawing/2014/main" xmlns="" id="{1D019969-CBDF-4237-B852-A32D22443744}"/>
+                  <a16:creationId xmlns="" xmlns:a16="http://schemas.microsoft.com/office/drawing/2014/main" id="{1D019969-CBDF-4237-B852-A32D22443744}"/>
                 </a:ext>
               </a:extLst>
             </p:cNvPr>
@@ -3856,7 +3856,7 @@
           <p:cNvPr id="22" name="pubsecblue">
             <a:extLst>
               <a:ext uri="{FF2B5EF4-FFF2-40B4-BE49-F238E27FC236}">
-                <a16:creationId xmlns:a16="http://schemas.microsoft.com/office/drawing/2014/main" xmlns="" id="{664491D0-D7B1-419D-B5D9-1449FC9D1505}"/>
+                <a16:creationId xmlns="" xmlns:a16="http://schemas.microsoft.com/office/drawing/2014/main" id="{664491D0-D7B1-419D-B5D9-1449FC9D1505}"/>
               </a:ext>
             </a:extLst>
           </p:cNvPr>
@@ -3892,7 +3892,7 @@
           <p:cNvPr id="46" name="Freeform: Shape 45">
             <a:extLst>
               <a:ext uri="{FF2B5EF4-FFF2-40B4-BE49-F238E27FC236}">
-                <a16:creationId xmlns:a16="http://schemas.microsoft.com/office/drawing/2014/main" xmlns="" id="{49DC84CA-CE72-4309-9EAB-66ED7D370A86}"/>
+                <a16:creationId xmlns="" xmlns:a16="http://schemas.microsoft.com/office/drawing/2014/main" id="{49DC84CA-CE72-4309-9EAB-66ED7D370A86}"/>
               </a:ext>
             </a:extLst>
           </p:cNvPr>
@@ -5287,7 +5287,7 @@
           <p:cNvPr id="47" name="TextBox 46">
             <a:extLst>
               <a:ext uri="{FF2B5EF4-FFF2-40B4-BE49-F238E27FC236}">
-                <a16:creationId xmlns:a16="http://schemas.microsoft.com/office/drawing/2014/main" xmlns="" id="{FE7BE31F-D58F-4CDD-BCD0-B28352F4F15B}"/>
+                <a16:creationId xmlns="" xmlns:a16="http://schemas.microsoft.com/office/drawing/2014/main" id="{FE7BE31F-D58F-4CDD-BCD0-B28352F4F15B}"/>
               </a:ext>
             </a:extLst>
           </p:cNvPr>
@@ -5358,7 +5358,7 @@
           <p:cNvPr id="76" name="Text Placeholder 75">
             <a:extLst>
               <a:ext uri="{FF2B5EF4-FFF2-40B4-BE49-F238E27FC236}">
-                <a16:creationId xmlns:a16="http://schemas.microsoft.com/office/drawing/2014/main" xmlns="" id="{7583CAB4-7373-41F5-97EA-0A14FC06C556}"/>
+                <a16:creationId xmlns="" xmlns:a16="http://schemas.microsoft.com/office/drawing/2014/main" id="{7583CAB4-7373-41F5-97EA-0A14FC06C556}"/>
               </a:ext>
             </a:extLst>
           </p:cNvPr>
@@ -5462,7 +5462,7 @@
           <p:cNvPr id="10" name="Picture 9">
             <a:extLst>
               <a:ext uri="{FF2B5EF4-FFF2-40B4-BE49-F238E27FC236}">
-                <a16:creationId xmlns:a16="http://schemas.microsoft.com/office/drawing/2014/main" xmlns="" id="{FA036C39-4AED-47FC-8411-6A2DD597B9D1}"/>
+                <a16:creationId xmlns="" xmlns:a16="http://schemas.microsoft.com/office/drawing/2014/main" id="{FA036C39-4AED-47FC-8411-6A2DD597B9D1}"/>
               </a:ext>
             </a:extLst>
           </p:cNvPr>
@@ -5679,7 +5679,7 @@
           <p:cNvPr id="12" name="TextBox 3">
             <a:extLst>
               <a:ext uri="{FF2B5EF4-FFF2-40B4-BE49-F238E27FC236}">
-                <a16:creationId xmlns:a16="http://schemas.microsoft.com/office/drawing/2014/main" xmlns="" id="{6F758A9E-D98A-4B48-B7C9-FD59B2A7D711}"/>
+                <a16:creationId xmlns="" xmlns:a16="http://schemas.microsoft.com/office/drawing/2014/main" id="{6F758A9E-D98A-4B48-B7C9-FD59B2A7D711}"/>
               </a:ext>
             </a:extLst>
           </p:cNvPr>
@@ -5843,7 +5843,7 @@
           <p:cNvPr id="14" name="Group 13">
             <a:extLst>
               <a:ext uri="{FF2B5EF4-FFF2-40B4-BE49-F238E27FC236}">
-                <a16:creationId xmlns:a16="http://schemas.microsoft.com/office/drawing/2014/main" xmlns="" id="{978734A4-78A3-4B0F-8BA1-D4EEAF971FBD}"/>
+                <a16:creationId xmlns="" xmlns:a16="http://schemas.microsoft.com/office/drawing/2014/main" id="{978734A4-78A3-4B0F-8BA1-D4EEAF971FBD}"/>
               </a:ext>
             </a:extLst>
           </p:cNvPr>
@@ -5863,7 +5863,7 @@
             <p:cNvPr id="22" name="TextBox 21">
               <a:extLst>
                 <a:ext uri="{FF2B5EF4-FFF2-40B4-BE49-F238E27FC236}">
-                  <a16:creationId xmlns:a16="http://schemas.microsoft.com/office/drawing/2014/main" xmlns="" id="{4815F495-94F2-4A6F-AB73-2B0266FF76D2}"/>
+                  <a16:creationId xmlns="" xmlns:a16="http://schemas.microsoft.com/office/drawing/2014/main" id="{4815F495-94F2-4A6F-AB73-2B0266FF76D2}"/>
                 </a:ext>
               </a:extLst>
             </p:cNvPr>
@@ -5913,7 +5913,7 @@
             <p:cNvPr id="21" name="Freeform: Shape 20">
               <a:extLst>
                 <a:ext uri="{FF2B5EF4-FFF2-40B4-BE49-F238E27FC236}">
-                  <a16:creationId xmlns:a16="http://schemas.microsoft.com/office/drawing/2014/main" xmlns="" id="{FCC86498-E577-4693-97D6-E4A4454E0AD4}"/>
+                  <a16:creationId xmlns="" xmlns:a16="http://schemas.microsoft.com/office/drawing/2014/main" id="{FCC86498-E577-4693-97D6-E4A4454E0AD4}"/>
                 </a:ext>
               </a:extLst>
             </p:cNvPr>
@@ -7349,7 +7349,7 @@
           <p:cNvPr id="15" name="pubsecblue">
             <a:extLst>
               <a:ext uri="{FF2B5EF4-FFF2-40B4-BE49-F238E27FC236}">
-                <a16:creationId xmlns:a16="http://schemas.microsoft.com/office/drawing/2014/main" xmlns="" id="{525C47FE-A728-4B64-8A4B-FA1C0E05E67B}"/>
+                <a16:creationId xmlns="" xmlns:a16="http://schemas.microsoft.com/office/drawing/2014/main" id="{525C47FE-A728-4B64-8A4B-FA1C0E05E67B}"/>
               </a:ext>
             </a:extLst>
           </p:cNvPr>
@@ -7431,7 +7431,7 @@
           <p:cNvPr id="7" name="TextBox 3">
             <a:extLst>
               <a:ext uri="{FF2B5EF4-FFF2-40B4-BE49-F238E27FC236}">
-                <a16:creationId xmlns:a16="http://schemas.microsoft.com/office/drawing/2014/main" xmlns="" id="{5E4808A6-4613-40BD-95F0-43BFC8327720}"/>
+                <a16:creationId xmlns="" xmlns:a16="http://schemas.microsoft.com/office/drawing/2014/main" id="{5E4808A6-4613-40BD-95F0-43BFC8327720}"/>
               </a:ext>
             </a:extLst>
           </p:cNvPr>
@@ -7595,7 +7595,7 @@
           <p:cNvPr id="11" name="Group 10">
             <a:extLst>
               <a:ext uri="{FF2B5EF4-FFF2-40B4-BE49-F238E27FC236}">
-                <a16:creationId xmlns:a16="http://schemas.microsoft.com/office/drawing/2014/main" xmlns="" id="{6E2AD9A2-F9BD-44EC-B2C7-643FA8ED744C}"/>
+                <a16:creationId xmlns="" xmlns:a16="http://schemas.microsoft.com/office/drawing/2014/main" id="{6E2AD9A2-F9BD-44EC-B2C7-643FA8ED744C}"/>
               </a:ext>
             </a:extLst>
           </p:cNvPr>
@@ -7615,7 +7615,7 @@
             <p:cNvPr id="12" name="TextBox 11">
               <a:extLst>
                 <a:ext uri="{FF2B5EF4-FFF2-40B4-BE49-F238E27FC236}">
-                  <a16:creationId xmlns:a16="http://schemas.microsoft.com/office/drawing/2014/main" xmlns="" id="{11904D6E-51A6-4FA4-94B6-F01D529B7C24}"/>
+                  <a16:creationId xmlns="" xmlns:a16="http://schemas.microsoft.com/office/drawing/2014/main" id="{11904D6E-51A6-4FA4-94B6-F01D529B7C24}"/>
                 </a:ext>
               </a:extLst>
             </p:cNvPr>
@@ -7665,7 +7665,7 @@
             <p:cNvPr id="13" name="Freeform: Shape 12">
               <a:extLst>
                 <a:ext uri="{FF2B5EF4-FFF2-40B4-BE49-F238E27FC236}">
-                  <a16:creationId xmlns:a16="http://schemas.microsoft.com/office/drawing/2014/main" xmlns="" id="{A856E380-8D41-4717-90CA-50E696F3E65E}"/>
+                  <a16:creationId xmlns="" xmlns:a16="http://schemas.microsoft.com/office/drawing/2014/main" id="{A856E380-8D41-4717-90CA-50E696F3E65E}"/>
                 </a:ext>
               </a:extLst>
             </p:cNvPr>
@@ -9184,7 +9184,7 @@
             <a:fld id="{7DDB771E-4AED-4DD3-8AA1-5D9FD2224F14}" type="datetimeFigureOut">
               <a:rPr lang="en-US" smtClean="0"/>
               <a:pPr/>
-              <a:t>6/4/2019</a:t>
+              <a:t>6/5/2019</a:t>
             </a:fld>
             <a:endParaRPr lang="en-US" dirty="0"/>
           </a:p>
@@ -9427,7 +9427,7 @@
             <a:fld id="{7DDB771E-4AED-4DD3-8AA1-5D9FD2224F14}" type="datetimeFigureOut">
               <a:rPr lang="en-US" smtClean="0"/>
               <a:pPr/>
-              <a:t>6/4/2019</a:t>
+              <a:t>6/5/2019</a:t>
             </a:fld>
             <a:endParaRPr lang="en-US" dirty="0"/>
           </a:p>
@@ -9712,7 +9712,7 @@
             <a:fld id="{7DDB771E-4AED-4DD3-8AA1-5D9FD2224F14}" type="datetimeFigureOut">
               <a:rPr lang="en-US" smtClean="0"/>
               <a:pPr/>
-              <a:t>6/4/2019</a:t>
+              <a:t>6/5/2019</a:t>
             </a:fld>
             <a:endParaRPr lang="en-US" dirty="0"/>
           </a:p>
@@ -10131,7 +10131,7 @@
             <a:fld id="{7DDB771E-4AED-4DD3-8AA1-5D9FD2224F14}" type="datetimeFigureOut">
               <a:rPr lang="en-US" smtClean="0"/>
               <a:pPr/>
-              <a:t>6/4/2019</a:t>
+              <a:t>6/5/2019</a:t>
             </a:fld>
             <a:endParaRPr lang="en-US" dirty="0"/>
           </a:p>
@@ -10246,7 +10246,7 @@
             <a:fld id="{7DDB771E-4AED-4DD3-8AA1-5D9FD2224F14}" type="datetimeFigureOut">
               <a:rPr lang="en-US" smtClean="0"/>
               <a:pPr/>
-              <a:t>6/4/2019</a:t>
+              <a:t>6/5/2019</a:t>
             </a:fld>
             <a:endParaRPr lang="en-US" dirty="0"/>
           </a:p>
@@ -10338,7 +10338,7 @@
             <a:fld id="{7DDB771E-4AED-4DD3-8AA1-5D9FD2224F14}" type="datetimeFigureOut">
               <a:rPr lang="en-US" smtClean="0"/>
               <a:pPr/>
-              <a:t>6/4/2019</a:t>
+              <a:t>6/5/2019</a:t>
             </a:fld>
             <a:endParaRPr lang="en-US" dirty="0"/>
           </a:p>
@@ -10612,7 +10612,7 @@
             <a:fld id="{7DDB771E-4AED-4DD3-8AA1-5D9FD2224F14}" type="datetimeFigureOut">
               <a:rPr lang="en-US" smtClean="0"/>
               <a:pPr/>
-              <a:t>6/4/2019</a:t>
+              <a:t>6/5/2019</a:t>
             </a:fld>
             <a:endParaRPr lang="en-US" dirty="0"/>
           </a:p>
@@ -10862,7 +10862,7 @@
             <a:fld id="{7DDB771E-4AED-4DD3-8AA1-5D9FD2224F14}" type="datetimeFigureOut">
               <a:rPr lang="en-US" smtClean="0"/>
               <a:pPr/>
-              <a:t>6/4/2019</a:t>
+              <a:t>6/5/2019</a:t>
             </a:fld>
             <a:endParaRPr lang="en-US" dirty="0"/>
           </a:p>
@@ -11072,7 +11072,7 @@
             <a:fld id="{7DDB771E-4AED-4DD3-8AA1-5D9FD2224F14}" type="datetimeFigureOut">
               <a:rPr lang="en-US" smtClean="0"/>
               <a:pPr/>
-              <a:t>6/4/2019</a:t>
+              <a:t>6/5/2019</a:t>
             </a:fld>
             <a:endParaRPr lang="en-US" dirty="0"/>
           </a:p>
@@ -11482,7 +11482,7 @@
           <p:cNvPr id="2" name="Text Placeholder 1">
             <a:extLst>
               <a:ext uri="{FF2B5EF4-FFF2-40B4-BE49-F238E27FC236}">
-                <a16:creationId xmlns:a16="http://schemas.microsoft.com/office/drawing/2014/main" xmlns="" id="{95BA791F-4607-4F4A-9AD6-5905307D3FD0}"/>
+                <a16:creationId xmlns="" xmlns:a16="http://schemas.microsoft.com/office/drawing/2014/main" id="{95BA791F-4607-4F4A-9AD6-5905307D3FD0}"/>
               </a:ext>
             </a:extLst>
           </p:cNvPr>
@@ -12137,7 +12137,7 @@
           <p:cNvPr id="3" name="Text Placeholder 2">
             <a:extLst>
               <a:ext uri="{FF2B5EF4-FFF2-40B4-BE49-F238E27FC236}">
-                <a16:creationId xmlns:a16="http://schemas.microsoft.com/office/drawing/2014/main" xmlns="" id="{CBD10F38-2636-4CED-A3FB-F0E2990384F9}"/>
+                <a16:creationId xmlns="" xmlns:a16="http://schemas.microsoft.com/office/drawing/2014/main" id="{CBD10F38-2636-4CED-A3FB-F0E2990384F9}"/>
               </a:ext>
             </a:extLst>
           </p:cNvPr>
@@ -13218,7 +13218,15 @@
             </a:r>
             <a:r>
               <a:rPr lang="en-US" dirty="0" smtClean="0"/>
-              <a:t>Bucket and Upload Deployment Artifacts</a:t>
+              <a:t>Bucket and Upload </a:t>
+            </a:r>
+            <a:r>
+              <a:rPr lang="en-US" dirty="0" smtClean="0"/>
+              <a:t>AWS CloudFormation Deployment </a:t>
+            </a:r>
+            <a:r>
+              <a:rPr lang="en-US" dirty="0" smtClean="0"/>
+              <a:t>Artifacts</a:t>
             </a:r>
           </a:p>
           <a:p>

</xml_diff>

<commit_message>
Updated AWS Public Sector Summit Slides
</commit_message>
<xml_diff>
--- a/slides/AWS-Public-Summit-EKS-Pipeline-QuickStart.pptx
+++ b/slides/AWS-Public-Summit-EKS-Pipeline-QuickStart.pptx
@@ -210,7 +210,7 @@
             <a:fld id="{814910AB-AEF0-414C-82CB-791080B1186B}" type="datetimeFigureOut">
               <a:rPr lang="en-US" smtClean="0"/>
               <a:pPr/>
-              <a:t>6/5/2019</a:t>
+              <a:t>6/10/2019</a:t>
             </a:fld>
             <a:endParaRPr lang="en-US" dirty="0"/>
           </a:p>
@@ -377,7 +377,7 @@
             <a:fld id="{5B4AE38D-E020-46F3-803D-8636C5B7B74E}" type="datetimeFigureOut">
               <a:rPr lang="en-US" smtClean="0"/>
               <a:pPr/>
-              <a:t>6/5/2019</a:t>
+              <a:t>6/10/2019</a:t>
             </a:fld>
             <a:endParaRPr lang="en-US" dirty="0"/>
           </a:p>
@@ -766,7 +766,7 @@
           <a:p>
             <a:fld id="{7785AE33-8762-CB48-8069-61FC714534F0}" type="datetime8">
               <a:rPr lang="en-US" smtClean="0"/>
-              <a:t>6/5/2019 1:08 PM</a:t>
+              <a:t>6/10/2019 11:37 AM</a:t>
             </a:fld>
             <a:endParaRPr lang="en-US" dirty="0"/>
           </a:p>
@@ -931,7 +931,7 @@
           <a:p>
             <a:fld id="{01882E56-9BBC-5549-962E-8E06798B1869}" type="datetime8">
               <a:rPr lang="en-US" smtClean="0"/>
-              <a:t>6/5/2019 1:08 PM</a:t>
+              <a:t>6/10/2019 11:37 AM</a:t>
             </a:fld>
             <a:endParaRPr lang="en-US" dirty="0"/>
           </a:p>
@@ -1177,7 +1177,7 @@
           <a:p>
             <a:fld id="{5BE8237A-4D68-A141-8155-E7C5F376347F}" type="datetime8">
               <a:rPr lang="en-US" smtClean="0"/>
-              <a:t>6/5/2019 1:08 PM</a:t>
+              <a:t>6/10/2019 11:37 AM</a:t>
             </a:fld>
             <a:endParaRPr lang="en-US" dirty="0"/>
           </a:p>
@@ -1572,7 +1572,7 @@
             <a:fld id="{7DDB771E-4AED-4DD3-8AA1-5D9FD2224F14}" type="datetimeFigureOut">
               <a:rPr lang="en-US" smtClean="0"/>
               <a:pPr/>
-              <a:t>6/5/2019</a:t>
+              <a:t>6/10/2019</a:t>
             </a:fld>
             <a:endParaRPr lang="en-US" dirty="0"/>
           </a:p>
@@ -1739,7 +1739,7 @@
             <a:fld id="{7DDB771E-4AED-4DD3-8AA1-5D9FD2224F14}" type="datetimeFigureOut">
               <a:rPr lang="en-US" smtClean="0"/>
               <a:pPr/>
-              <a:t>6/5/2019</a:t>
+              <a:t>6/10/2019</a:t>
             </a:fld>
             <a:endParaRPr lang="en-US" dirty="0"/>
           </a:p>
@@ -1916,7 +1916,7 @@
             <a:fld id="{7DDB771E-4AED-4DD3-8AA1-5D9FD2224F14}" type="datetimeFigureOut">
               <a:rPr lang="en-US" smtClean="0"/>
               <a:pPr/>
-              <a:t>6/5/2019</a:t>
+              <a:t>6/10/2019</a:t>
             </a:fld>
             <a:endParaRPr lang="en-US" dirty="0"/>
           </a:p>
@@ -9184,7 +9184,7 @@
             <a:fld id="{7DDB771E-4AED-4DD3-8AA1-5D9FD2224F14}" type="datetimeFigureOut">
               <a:rPr lang="en-US" smtClean="0"/>
               <a:pPr/>
-              <a:t>6/5/2019</a:t>
+              <a:t>6/10/2019</a:t>
             </a:fld>
             <a:endParaRPr lang="en-US" dirty="0"/>
           </a:p>
@@ -9427,7 +9427,7 @@
             <a:fld id="{7DDB771E-4AED-4DD3-8AA1-5D9FD2224F14}" type="datetimeFigureOut">
               <a:rPr lang="en-US" smtClean="0"/>
               <a:pPr/>
-              <a:t>6/5/2019</a:t>
+              <a:t>6/10/2019</a:t>
             </a:fld>
             <a:endParaRPr lang="en-US" dirty="0"/>
           </a:p>
@@ -9712,7 +9712,7 @@
             <a:fld id="{7DDB771E-4AED-4DD3-8AA1-5D9FD2224F14}" type="datetimeFigureOut">
               <a:rPr lang="en-US" smtClean="0"/>
               <a:pPr/>
-              <a:t>6/5/2019</a:t>
+              <a:t>6/10/2019</a:t>
             </a:fld>
             <a:endParaRPr lang="en-US" dirty="0"/>
           </a:p>
@@ -10131,7 +10131,7 @@
             <a:fld id="{7DDB771E-4AED-4DD3-8AA1-5D9FD2224F14}" type="datetimeFigureOut">
               <a:rPr lang="en-US" smtClean="0"/>
               <a:pPr/>
-              <a:t>6/5/2019</a:t>
+              <a:t>6/10/2019</a:t>
             </a:fld>
             <a:endParaRPr lang="en-US" dirty="0"/>
           </a:p>
@@ -10246,7 +10246,7 @@
             <a:fld id="{7DDB771E-4AED-4DD3-8AA1-5D9FD2224F14}" type="datetimeFigureOut">
               <a:rPr lang="en-US" smtClean="0"/>
               <a:pPr/>
-              <a:t>6/5/2019</a:t>
+              <a:t>6/10/2019</a:t>
             </a:fld>
             <a:endParaRPr lang="en-US" dirty="0"/>
           </a:p>
@@ -10338,7 +10338,7 @@
             <a:fld id="{7DDB771E-4AED-4DD3-8AA1-5D9FD2224F14}" type="datetimeFigureOut">
               <a:rPr lang="en-US" smtClean="0"/>
               <a:pPr/>
-              <a:t>6/5/2019</a:t>
+              <a:t>6/10/2019</a:t>
             </a:fld>
             <a:endParaRPr lang="en-US" dirty="0"/>
           </a:p>
@@ -10612,7 +10612,7 @@
             <a:fld id="{7DDB771E-4AED-4DD3-8AA1-5D9FD2224F14}" type="datetimeFigureOut">
               <a:rPr lang="en-US" smtClean="0"/>
               <a:pPr/>
-              <a:t>6/5/2019</a:t>
+              <a:t>6/10/2019</a:t>
             </a:fld>
             <a:endParaRPr lang="en-US" dirty="0"/>
           </a:p>
@@ -10862,7 +10862,7 @@
             <a:fld id="{7DDB771E-4AED-4DD3-8AA1-5D9FD2224F14}" type="datetimeFigureOut">
               <a:rPr lang="en-US" smtClean="0"/>
               <a:pPr/>
-              <a:t>6/5/2019</a:t>
+              <a:t>6/10/2019</a:t>
             </a:fld>
             <a:endParaRPr lang="en-US" dirty="0"/>
           </a:p>
@@ -11072,7 +11072,7 @@
             <a:fld id="{7DDB771E-4AED-4DD3-8AA1-5D9FD2224F14}" type="datetimeFigureOut">
               <a:rPr lang="en-US" smtClean="0"/>
               <a:pPr/>
-              <a:t>6/5/2019</a:t>
+              <a:t>6/10/2019</a:t>
             </a:fld>
             <a:endParaRPr lang="en-US" dirty="0"/>
           </a:p>
@@ -11706,7 +11706,15 @@
             </a:r>
             <a:r>
               <a:rPr lang="en-US" dirty="0" smtClean="0"/>
-              <a:t> We should see the message “Hello World” appear when we access the load balancer endpoint for the microservice</a:t>
+              <a:t> We should see the </a:t>
+            </a:r>
+            <a:r>
+              <a:rPr lang="en-US" dirty="0" smtClean="0"/>
+              <a:t>new modified “</a:t>
+            </a:r>
+            <a:r>
+              <a:rPr lang="en-US" dirty="0" smtClean="0"/>
+              <a:t>Hello World” appear when we access the load balancer endpoint for the microservice</a:t>
             </a:r>
           </a:p>
         </p:txBody>
@@ -11827,7 +11835,15 @@
             </a:r>
             <a:r>
               <a:rPr lang="en-US" dirty="0" smtClean="0"/>
-              <a:t> Still a lot of manual steps to setup</a:t>
+              <a:t> Still a </a:t>
+            </a:r>
+            <a:r>
+              <a:rPr lang="en-US" dirty="0" smtClean="0"/>
+              <a:t>few manual </a:t>
+            </a:r>
+            <a:r>
+              <a:rPr lang="en-US" dirty="0" smtClean="0"/>
+              <a:t>steps to setup</a:t>
             </a:r>
           </a:p>
           <a:p>
@@ -11876,7 +11892,15 @@
             </a:pPr>
             <a:r>
               <a:rPr lang="en-US" dirty="0" smtClean="0"/>
-              <a:t>  Saves a huge amount Initial Setup Time</a:t>
+              <a:t>  Saves a huge amount </a:t>
+            </a:r>
+            <a:r>
+              <a:rPr lang="en-US" dirty="0" smtClean="0"/>
+              <a:t>time for an Initial </a:t>
+            </a:r>
+            <a:r>
+              <a:rPr lang="en-US" dirty="0" smtClean="0"/>
+              <a:t>Setup</a:t>
             </a:r>
           </a:p>
           <a:p>
@@ -12239,14 +12263,10 @@
           <a:bodyPr/>
           <a:lstStyle/>
           <a:p>
-            <a:pPr lvl="0">
-              <a:defRPr/>
-            </a:pPr>
             <a:r>
               <a:rPr lang="en-US" sz="4000" dirty="0"/>
-              <a:t>AWS Elastic Kubernetes Service (EKS) CI/CD Pipeline QuickStart</a:t>
-            </a:r>
-            <a:endParaRPr lang="en-US" sz="4000" spc="0" dirty="0"/>
+              <a:t>AWS EKS Pipeline QuickStart</a:t>
+            </a:r>
           </a:p>
         </p:txBody>
       </p:sp>
@@ -12309,9 +12329,10 @@
           <a:lstStyle/>
           <a:p>
             <a:r>
-              <a:rPr lang="en-US" dirty="0"/>
-              <a:t>SessionID</a:t>
-            </a:r>
+              <a:rPr lang="en-US" dirty="0" smtClean="0"/>
+              <a:t>DEV08</a:t>
+            </a:r>
+            <a:endParaRPr lang="en-US" dirty="0"/>
           </a:p>
         </p:txBody>
       </p:sp>
@@ -12537,7 +12558,7 @@
             </a:r>
             <a:r>
               <a:rPr lang="en-US" dirty="0" smtClean="0"/>
-              <a:t> Modern Software Lifecycle Demand It</a:t>
+              <a:t> A Modern Software Lifecycle Demands It</a:t>
             </a:r>
           </a:p>
         </p:txBody>
@@ -12743,7 +12764,11 @@
             </a:r>
             <a:r>
               <a:rPr lang="en-US" dirty="0" smtClean="0"/>
-              <a:t> Do we really need to start from scratch?</a:t>
+              <a:t> </a:t>
+            </a:r>
+            <a:r>
+              <a:rPr lang="en-US" b="1" i="1" dirty="0" smtClean="0"/>
+              <a:t>Do we really need to start from scratch?</a:t>
             </a:r>
           </a:p>
         </p:txBody>
@@ -12906,7 +12931,7 @@
         <p:spPr>
           <a:xfrm>
             <a:off x="1263242" y="1572798"/>
-            <a:ext cx="6705600" cy="1477328"/>
+            <a:ext cx="6705600" cy="923330"/>
           </a:xfrm>
           <a:prstGeom prst="rect">
             <a:avLst/>
@@ -12925,7 +12950,7 @@
             </a:pPr>
             <a:r>
               <a:rPr lang="en-US" dirty="0" smtClean="0"/>
-              <a:t>  AWS Account (Root)</a:t>
+              <a:t>  AWS EKS Cluster Configured</a:t>
             </a:r>
           </a:p>
           <a:p>
@@ -12935,31 +12960,7 @@
             </a:pPr>
             <a:r>
               <a:rPr lang="en-US" dirty="0" smtClean="0"/>
-              <a:t>  AWS EKS Cluster Configured</a:t>
-            </a:r>
-          </a:p>
-          <a:p>
-            <a:pPr>
-              <a:buFont typeface="Arial" pitchFamily="34" charset="0"/>
-              <a:buChar char="•"/>
-            </a:pPr>
-            <a:r>
-              <a:rPr lang="en-US" dirty="0" smtClean="0"/>
               <a:t>  EC2 Instance with “kubectl” installed and configured to talk to the cluster</a:t>
-            </a:r>
-          </a:p>
-          <a:p>
-            <a:pPr>
-              <a:buFont typeface="Arial" pitchFamily="34" charset="0"/>
-              <a:buChar char="•"/>
-            </a:pPr>
-            <a:r>
-              <a:rPr lang="en-US" dirty="0"/>
-              <a:t> </a:t>
-            </a:r>
-            <a:r>
-              <a:rPr lang="en-US" dirty="0" smtClean="0"/>
-              <a:t> Optional Kubernetes Dashboard</a:t>
             </a:r>
           </a:p>
         </p:txBody>
@@ -13159,7 +13160,7 @@
         <p:spPr>
           <a:xfrm>
             <a:off x="510439" y="1782918"/>
-            <a:ext cx="8245634" cy="2031325"/>
+            <a:ext cx="8245634" cy="1754326"/>
           </a:xfrm>
           <a:prstGeom prst="rect">
             <a:avLst/>
@@ -13178,15 +13179,15 @@
             </a:pPr>
             <a:r>
               <a:rPr lang="en-US" dirty="0" smtClean="0"/>
-              <a:t>Checkout </a:t>
+              <a:t>Deploy </a:t>
             </a:r>
             <a:r>
               <a:rPr lang="en-US" dirty="0"/>
-              <a:t>aws-eks-pipeline-quickstart from </a:t>
+              <a:t>the Initial </a:t>
             </a:r>
             <a:r>
               <a:rPr lang="en-US" dirty="0" smtClean="0"/>
-              <a:t>github</a:t>
+              <a:t>Application</a:t>
             </a:r>
           </a:p>
           <a:p>
@@ -13195,16 +13196,12 @@
               <a:buChar char="•"/>
             </a:pPr>
             <a:r>
+              <a:rPr lang="en-US" dirty="0"/>
+              <a:t>Create </a:t>
+            </a:r>
+            <a:r>
               <a:rPr lang="en-US" dirty="0" smtClean="0"/>
-              <a:t>Deploy </a:t>
-            </a:r>
-            <a:r>
-              <a:rPr lang="en-US" dirty="0"/>
-              <a:t>the Initial </a:t>
-            </a:r>
-            <a:r>
-              <a:rPr lang="en-US" dirty="0" smtClean="0"/>
-              <a:t>Application</a:t>
+              <a:t>an S3 Bucket and Upload AWS CloudFormation Deployment Artifacts</a:t>
             </a:r>
           </a:p>
           <a:p>
@@ -13213,20 +13210,16 @@
               <a:buChar char="•"/>
             </a:pPr>
             <a:r>
+              <a:rPr lang="en-US" dirty="0" smtClean="0"/>
+              <a:t>Use AWS CloudFormation </a:t>
+            </a:r>
+            <a:r>
               <a:rPr lang="en-US" dirty="0"/>
-              <a:t>Create S3 </a:t>
+              <a:t>to Create the CI/CD </a:t>
             </a:r>
             <a:r>
               <a:rPr lang="en-US" dirty="0" smtClean="0"/>
-              <a:t>Bucket and Upload </a:t>
-            </a:r>
-            <a:r>
-              <a:rPr lang="en-US" dirty="0" smtClean="0"/>
-              <a:t>AWS CloudFormation Deployment </a:t>
-            </a:r>
-            <a:r>
-              <a:rPr lang="en-US" dirty="0" smtClean="0"/>
-              <a:t>Artifacts</a:t>
+              <a:t>Pipeline</a:t>
             </a:r>
           </a:p>
           <a:p>
@@ -13235,30 +13228,12 @@
               <a:buChar char="•"/>
             </a:pPr>
             <a:r>
-              <a:rPr lang="en-US" dirty="0" smtClean="0"/>
-              <a:t>Use AWS CloudFormation </a:t>
-            </a:r>
-            <a:r>
-              <a:rPr lang="en-US" dirty="0"/>
-              <a:t>to Create the CI/CD </a:t>
-            </a:r>
-            <a:r>
-              <a:rPr lang="en-US" dirty="0" smtClean="0"/>
-              <a:t>Pipeline</a:t>
-            </a:r>
-          </a:p>
-          <a:p>
-            <a:pPr marL="285750" indent="-285750">
-              <a:buFont typeface="Arial" pitchFamily="34" charset="0"/>
-              <a:buChar char="•"/>
-            </a:pPr>
-            <a:r>
               <a:rPr lang="en-US" dirty="0"/>
               <a:t>Give Lambda Execution Role Permissions in </a:t>
             </a:r>
             <a:r>
               <a:rPr lang="en-US" dirty="0" smtClean="0"/>
-              <a:t>AWS EKS Cluster</a:t>
+              <a:t>AWS EKS Cluster using kubectl</a:t>
             </a:r>
           </a:p>
           <a:p>

</xml_diff>